<commit_message>
More branching lecture updated
</commit_message>
<xml_diff>
--- a/slides/On-Campus/10_02_MoreBranching.pptx
+++ b/slides/On-Campus/10_02_MoreBranching.pptx
@@ -144,272 +144,34 @@
 <file path=ppt/changesInfos/changesInfo1.xml><?xml version="1.0" encoding="utf-8"?>
 <pc:chgInfo xmlns:a="http://schemas.openxmlformats.org/drawingml/2006/main" xmlns:r="http://schemas.openxmlformats.org/officeDocument/2006/relationships" xmlns:ac="http://schemas.microsoft.com/office/drawing/2013/main/command" xmlns:pc="http://schemas.microsoft.com/office/powerpoint/2013/main/command">
   <pc:docChgLst>
-    <pc:chgData name="Marcia Moraes" userId="c9c67e8a-58e2-4733-9a1c-5d44fec4775b" providerId="ADAL" clId="{4FD32692-1E97-46E6-A4ED-31D1BB258627}"/>
-    <pc:docChg chg="custSel addSld modSld">
-      <pc:chgData name="Marcia Moraes" userId="c9c67e8a-58e2-4733-9a1c-5d44fec4775b" providerId="ADAL" clId="{4FD32692-1E97-46E6-A4ED-31D1BB258627}" dt="2023-10-27T17:35:04.125" v="606" actId="20577"/>
+    <pc:chgData name="Marcia Moraes" userId="c9c67e8a-58e2-4733-9a1c-5d44fec4775b" providerId="ADAL" clId="{CD6829F0-41E3-44AC-B9CB-3808A0F566B3}"/>
+    <pc:docChg chg="modSld">
+      <pc:chgData name="Marcia Moraes" userId="c9c67e8a-58e2-4733-9a1c-5d44fec4775b" providerId="ADAL" clId="{CD6829F0-41E3-44AC-B9CB-3808A0F566B3}" dt="2024-03-07T20:10:30.637" v="2" actId="20577"/>
       <pc:docMkLst>
         <pc:docMk/>
       </pc:docMkLst>
       <pc:sldChg chg="modSp">
-        <pc:chgData name="Marcia Moraes" userId="c9c67e8a-58e2-4733-9a1c-5d44fec4775b" providerId="ADAL" clId="{4FD32692-1E97-46E6-A4ED-31D1BB258627}" dt="2023-10-22T14:32:37.930" v="0" actId="6549"/>
-        <pc:sldMkLst>
-          <pc:docMk/>
-          <pc:sldMk cId="661209559" sldId="256"/>
-        </pc:sldMkLst>
-        <pc:spChg chg="mod">
-          <ac:chgData name="Marcia Moraes" userId="c9c67e8a-58e2-4733-9a1c-5d44fec4775b" providerId="ADAL" clId="{4FD32692-1E97-46E6-A4ED-31D1BB258627}" dt="2023-10-22T14:32:37.930" v="0" actId="6549"/>
-          <ac:spMkLst>
-            <pc:docMk/>
-            <pc:sldMk cId="661209559" sldId="256"/>
-            <ac:spMk id="4" creationId="{36830EDF-82C3-4D4E-8F52-61F2DB42DA11}"/>
-          </ac:spMkLst>
-        </pc:spChg>
-      </pc:sldChg>
-      <pc:sldChg chg="addSp delSp modSp modAnim">
-        <pc:chgData name="Marcia Moraes" userId="c9c67e8a-58e2-4733-9a1c-5d44fec4775b" providerId="ADAL" clId="{4FD32692-1E97-46E6-A4ED-31D1BB258627}" dt="2023-10-22T14:47:07.461" v="59" actId="20577"/>
-        <pc:sldMkLst>
-          <pc:docMk/>
-          <pc:sldMk cId="2451232438" sldId="260"/>
-        </pc:sldMkLst>
-        <pc:spChg chg="add">
-          <ac:chgData name="Marcia Moraes" userId="c9c67e8a-58e2-4733-9a1c-5d44fec4775b" providerId="ADAL" clId="{4FD32692-1E97-46E6-A4ED-31D1BB258627}" dt="2023-10-22T14:43:21.029" v="8"/>
-          <ac:spMkLst>
-            <pc:docMk/>
-            <pc:sldMk cId="2451232438" sldId="260"/>
-            <ac:spMk id="5" creationId="{0C2DC83F-5E06-468D-940B-E963078CB706}"/>
-          </ac:spMkLst>
-        </pc:spChg>
-        <pc:spChg chg="mod">
-          <ac:chgData name="Marcia Moraes" userId="c9c67e8a-58e2-4733-9a1c-5d44fec4775b" providerId="ADAL" clId="{4FD32692-1E97-46E6-A4ED-31D1BB258627}" dt="2023-10-22T14:47:07.461" v="59" actId="20577"/>
-          <ac:spMkLst>
-            <pc:docMk/>
-            <pc:sldMk cId="2451232438" sldId="260"/>
-            <ac:spMk id="6" creationId="{070BA3BB-E4AC-1442-9C1B-434DA00352F6}"/>
-          </ac:spMkLst>
-        </pc:spChg>
-        <pc:spChg chg="add">
-          <ac:chgData name="Marcia Moraes" userId="c9c67e8a-58e2-4733-9a1c-5d44fec4775b" providerId="ADAL" clId="{4FD32692-1E97-46E6-A4ED-31D1BB258627}" dt="2023-10-22T14:43:21.029" v="8"/>
-          <ac:spMkLst>
-            <pc:docMk/>
-            <pc:sldMk cId="2451232438" sldId="260"/>
-            <ac:spMk id="7" creationId="{514F51EE-8D75-4128-B092-DE106BD7923C}"/>
-          </ac:spMkLst>
-        </pc:spChg>
-        <pc:picChg chg="del">
-          <ac:chgData name="Marcia Moraes" userId="c9c67e8a-58e2-4733-9a1c-5d44fec4775b" providerId="ADAL" clId="{4FD32692-1E97-46E6-A4ED-31D1BB258627}" dt="2023-10-22T14:43:19.629" v="7" actId="478"/>
-          <ac:picMkLst>
-            <pc:docMk/>
-            <pc:sldMk cId="2451232438" sldId="260"/>
-            <ac:picMk id="2" creationId="{7BD72A2D-2676-4340-837C-2C528969126E}"/>
-          </ac:picMkLst>
-        </pc:picChg>
-      </pc:sldChg>
-      <pc:sldChg chg="addSp delSp modSp">
-        <pc:chgData name="Marcia Moraes" userId="c9c67e8a-58e2-4733-9a1c-5d44fec4775b" providerId="ADAL" clId="{4FD32692-1E97-46E6-A4ED-31D1BB258627}" dt="2023-10-27T17:35:04.125" v="606" actId="20577"/>
+        <pc:chgData name="Marcia Moraes" userId="c9c67e8a-58e2-4733-9a1c-5d44fec4775b" providerId="ADAL" clId="{CD6829F0-41E3-44AC-B9CB-3808A0F566B3}" dt="2024-03-07T20:10:30.637" v="2" actId="20577"/>
         <pc:sldMkLst>
           <pc:docMk/>
           <pc:sldMk cId="2571368551" sldId="272"/>
         </pc:sldMkLst>
-        <pc:spChg chg="mod">
-          <ac:chgData name="Marcia Moraes" userId="c9c67e8a-58e2-4733-9a1c-5d44fec4775b" providerId="ADAL" clId="{4FD32692-1E97-46E6-A4ED-31D1BB258627}" dt="2023-10-22T14:38:17.337" v="6"/>
-          <ac:spMkLst>
+        <pc:graphicFrameChg chg="modGraphic">
+          <ac:chgData name="Marcia Moraes" userId="c9c67e8a-58e2-4733-9a1c-5d44fec4775b" providerId="ADAL" clId="{CD6829F0-41E3-44AC-B9CB-3808A0F566B3}" dt="2024-03-07T20:10:30.637" v="2" actId="20577"/>
+          <ac:graphicFrameMkLst>
             <pc:docMk/>
             <pc:sldMk cId="2571368551" sldId="272"/>
-            <ac:spMk id="2" creationId="{84CD52E7-9878-46B0-B322-12FDC9581986}"/>
-          </ac:spMkLst>
-        </pc:spChg>
-        <pc:spChg chg="mod">
-          <ac:chgData name="Marcia Moraes" userId="c9c67e8a-58e2-4733-9a1c-5d44fec4775b" providerId="ADAL" clId="{4FD32692-1E97-46E6-A4ED-31D1BB258627}" dt="2023-10-27T17:35:04.125" v="606" actId="20577"/>
-          <ac:spMkLst>
-            <pc:docMk/>
-            <pc:sldMk cId="2571368551" sldId="272"/>
-            <ac:spMk id="11" creationId="{BDA0DBC1-29A7-4498-B9AA-9B174D0FEC3E}"/>
-          </ac:spMkLst>
-        </pc:spChg>
-        <pc:picChg chg="add mod">
-          <ac:chgData name="Marcia Moraes" userId="c9c67e8a-58e2-4733-9a1c-5d44fec4775b" providerId="ADAL" clId="{4FD32692-1E97-46E6-A4ED-31D1BB258627}" dt="2023-10-22T14:36:53.595" v="5" actId="14100"/>
-          <ac:picMkLst>
-            <pc:docMk/>
-            <pc:sldMk cId="2571368551" sldId="272"/>
-            <ac:picMk id="3" creationId="{D91F9026-FD56-4A83-B29E-B094B7DBCB44}"/>
-          </ac:picMkLst>
-        </pc:picChg>
-        <pc:picChg chg="del">
-          <ac:chgData name="Marcia Moraes" userId="c9c67e8a-58e2-4733-9a1c-5d44fec4775b" providerId="ADAL" clId="{4FD32692-1E97-46E6-A4ED-31D1BB258627}" dt="2023-10-22T14:36:43.009" v="1" actId="478"/>
-          <ac:picMkLst>
-            <pc:docMk/>
-            <pc:sldMk cId="2571368551" sldId="272"/>
-            <ac:picMk id="1026" creationId="{76F90ADF-7BC1-487D-A39C-C9BE9DA546D3}"/>
-          </ac:picMkLst>
-        </pc:picChg>
-      </pc:sldChg>
-      <pc:sldChg chg="modSp">
-        <pc:chgData name="Marcia Moraes" userId="c9c67e8a-58e2-4733-9a1c-5d44fec4775b" providerId="ADAL" clId="{4FD32692-1E97-46E6-A4ED-31D1BB258627}" dt="2023-10-23T02:16:48.380" v="605" actId="6549"/>
-        <pc:sldMkLst>
-          <pc:docMk/>
-          <pc:sldMk cId="1583649201" sldId="273"/>
-        </pc:sldMkLst>
-        <pc:spChg chg="mod">
-          <ac:chgData name="Marcia Moraes" userId="c9c67e8a-58e2-4733-9a1c-5d44fec4775b" providerId="ADAL" clId="{4FD32692-1E97-46E6-A4ED-31D1BB258627}" dt="2023-10-23T02:16:48.380" v="605" actId="6549"/>
-          <ac:spMkLst>
-            <pc:docMk/>
-            <pc:sldMk cId="1583649201" sldId="273"/>
-            <ac:spMk id="3" creationId="{507F2138-38CE-FB4F-963C-1AF7D9CA4471}"/>
-          </ac:spMkLst>
-        </pc:spChg>
-      </pc:sldChg>
-      <pc:sldChg chg="addSp delSp modSp add delAnim">
-        <pc:chgData name="Marcia Moraes" userId="c9c67e8a-58e2-4733-9a1c-5d44fec4775b" providerId="ADAL" clId="{4FD32692-1E97-46E6-A4ED-31D1BB258627}" dt="2023-10-22T15:45:51.642" v="392" actId="20577"/>
-        <pc:sldMkLst>
-          <pc:docMk/>
-          <pc:sldMk cId="2326572798" sldId="278"/>
-        </pc:sldMkLst>
-        <pc:spChg chg="mod">
-          <ac:chgData name="Marcia Moraes" userId="c9c67e8a-58e2-4733-9a1c-5d44fec4775b" providerId="ADAL" clId="{4FD32692-1E97-46E6-A4ED-31D1BB258627}" dt="2023-10-22T15:45:51.642" v="392" actId="20577"/>
-          <ac:spMkLst>
-            <pc:docMk/>
-            <pc:sldMk cId="2326572798" sldId="278"/>
-            <ac:spMk id="2" creationId="{2DBAED83-8A0A-0548-BA23-13CB5D45BC8F}"/>
-          </ac:spMkLst>
-        </pc:spChg>
-        <pc:spChg chg="add mod">
-          <ac:chgData name="Marcia Moraes" userId="c9c67e8a-58e2-4733-9a1c-5d44fec4775b" providerId="ADAL" clId="{4FD32692-1E97-46E6-A4ED-31D1BB258627}" dt="2023-10-22T14:59:06.224" v="79" actId="20577"/>
-          <ac:spMkLst>
-            <pc:docMk/>
-            <pc:sldMk cId="2326572798" sldId="278"/>
-            <ac:spMk id="3" creationId="{1E29869B-115C-4D02-9993-8B4C66EE6496}"/>
-          </ac:spMkLst>
-        </pc:spChg>
-        <pc:spChg chg="add mod">
-          <ac:chgData name="Marcia Moraes" userId="c9c67e8a-58e2-4733-9a1c-5d44fec4775b" providerId="ADAL" clId="{4FD32692-1E97-46E6-A4ED-31D1BB258627}" dt="2023-10-22T15:37:37.934" v="155" actId="255"/>
-          <ac:spMkLst>
-            <pc:docMk/>
-            <pc:sldMk cId="2326572798" sldId="278"/>
-            <ac:spMk id="4" creationId="{00293F78-D689-41F1-966D-4735304EEFEF}"/>
-          </ac:spMkLst>
-        </pc:spChg>
-        <pc:spChg chg="add mod">
-          <ac:chgData name="Marcia Moraes" userId="c9c67e8a-58e2-4733-9a1c-5d44fec4775b" providerId="ADAL" clId="{4FD32692-1E97-46E6-A4ED-31D1BB258627}" dt="2023-10-22T15:37:29.369" v="153" actId="1076"/>
-          <ac:spMkLst>
-            <pc:docMk/>
-            <pc:sldMk cId="2326572798" sldId="278"/>
-            <ac:spMk id="13" creationId="{30C7917D-BD0B-4925-8427-68F50A760693}"/>
-          </ac:spMkLst>
-        </pc:spChg>
-        <pc:picChg chg="del">
-          <ac:chgData name="Marcia Moraes" userId="c9c67e8a-58e2-4733-9a1c-5d44fec4775b" providerId="ADAL" clId="{4FD32692-1E97-46E6-A4ED-31D1BB258627}" dt="2023-10-22T14:58:14.638" v="61" actId="478"/>
-          <ac:picMkLst>
-            <pc:docMk/>
-            <pc:sldMk cId="2326572798" sldId="278"/>
-            <ac:picMk id="7" creationId="{56E929CB-8E45-46F5-B012-D24592395CED}"/>
-          </ac:picMkLst>
-        </pc:picChg>
-        <pc:picChg chg="del">
-          <ac:chgData name="Marcia Moraes" userId="c9c67e8a-58e2-4733-9a1c-5d44fec4775b" providerId="ADAL" clId="{4FD32692-1E97-46E6-A4ED-31D1BB258627}" dt="2023-10-22T14:58:17.630" v="63" actId="478"/>
-          <ac:picMkLst>
-            <pc:docMk/>
-            <pc:sldMk cId="2326572798" sldId="278"/>
-            <ac:picMk id="9" creationId="{394FD34C-EDAF-4490-B72A-CE018B12FB68}"/>
-          </ac:picMkLst>
-        </pc:picChg>
-        <pc:picChg chg="del">
-          <ac:chgData name="Marcia Moraes" userId="c9c67e8a-58e2-4733-9a1c-5d44fec4775b" providerId="ADAL" clId="{4FD32692-1E97-46E6-A4ED-31D1BB258627}" dt="2023-10-22T14:58:15.829" v="62" actId="478"/>
-          <ac:picMkLst>
-            <pc:docMk/>
-            <pc:sldMk cId="2326572798" sldId="278"/>
-            <ac:picMk id="10" creationId="{B7DEB14E-55B9-4F2E-AC20-03BC01D53DE3}"/>
-          </ac:picMkLst>
-        </pc:picChg>
-        <pc:picChg chg="del">
-          <ac:chgData name="Marcia Moraes" userId="c9c67e8a-58e2-4733-9a1c-5d44fec4775b" providerId="ADAL" clId="{4FD32692-1E97-46E6-A4ED-31D1BB258627}" dt="2023-10-22T14:58:18.837" v="64" actId="478"/>
-          <ac:picMkLst>
-            <pc:docMk/>
-            <pc:sldMk cId="2326572798" sldId="278"/>
-            <ac:picMk id="11" creationId="{A0AE86B8-2766-40C2-9708-606E6F740123}"/>
-          </ac:picMkLst>
-        </pc:picChg>
-        <pc:picChg chg="del">
-          <ac:chgData name="Marcia Moraes" userId="c9c67e8a-58e2-4733-9a1c-5d44fec4775b" providerId="ADAL" clId="{4FD32692-1E97-46E6-A4ED-31D1BB258627}" dt="2023-10-22T14:58:19.632" v="65" actId="478"/>
-          <ac:picMkLst>
-            <pc:docMk/>
-            <pc:sldMk cId="2326572798" sldId="278"/>
-            <ac:picMk id="12" creationId="{5DC2DC2C-6A1C-460D-85A1-1651E281C2DE}"/>
-          </ac:picMkLst>
-        </pc:picChg>
-      </pc:sldChg>
-      <pc:sldChg chg="addSp delSp modSp add delAnim">
-        <pc:chgData name="Marcia Moraes" userId="c9c67e8a-58e2-4733-9a1c-5d44fec4775b" providerId="ADAL" clId="{4FD32692-1E97-46E6-A4ED-31D1BB258627}" dt="2023-10-22T15:49:43.483" v="601" actId="207"/>
-        <pc:sldMkLst>
-          <pc:docMk/>
-          <pc:sldMk cId="3438836200" sldId="279"/>
-        </pc:sldMkLst>
-        <pc:spChg chg="mod">
-          <ac:chgData name="Marcia Moraes" userId="c9c67e8a-58e2-4733-9a1c-5d44fec4775b" providerId="ADAL" clId="{4FD32692-1E97-46E6-A4ED-31D1BB258627}" dt="2023-10-22T15:47:53.943" v="574" actId="1076"/>
-          <ac:spMkLst>
-            <pc:docMk/>
-            <pc:sldMk cId="3438836200" sldId="279"/>
-            <ac:spMk id="2" creationId="{017F8622-A942-7747-97AF-5DBB1715C95D}"/>
-          </ac:spMkLst>
-        </pc:spChg>
-        <pc:spChg chg="mod">
-          <ac:chgData name="Marcia Moraes" userId="c9c67e8a-58e2-4733-9a1c-5d44fec4775b" providerId="ADAL" clId="{4FD32692-1E97-46E6-A4ED-31D1BB258627}" dt="2023-10-22T15:48:58.070" v="594" actId="14100"/>
-          <ac:spMkLst>
-            <pc:docMk/>
-            <pc:sldMk cId="3438836200" sldId="279"/>
-            <ac:spMk id="3" creationId="{13F89D5A-AB50-3643-8D05-9160C6481A9E}"/>
-          </ac:spMkLst>
-        </pc:spChg>
-        <pc:spChg chg="del">
-          <ac:chgData name="Marcia Moraes" userId="c9c67e8a-58e2-4733-9a1c-5d44fec4775b" providerId="ADAL" clId="{4FD32692-1E97-46E6-A4ED-31D1BB258627}" dt="2023-10-22T15:40:08.511" v="157" actId="478"/>
-          <ac:spMkLst>
-            <pc:docMk/>
-            <pc:sldMk cId="3438836200" sldId="279"/>
-            <ac:spMk id="4" creationId="{313E92A7-F87C-8749-8077-6AF601BC96DD}"/>
-          </ac:spMkLst>
-        </pc:spChg>
-        <pc:spChg chg="del">
-          <ac:chgData name="Marcia Moraes" userId="c9c67e8a-58e2-4733-9a1c-5d44fec4775b" providerId="ADAL" clId="{4FD32692-1E97-46E6-A4ED-31D1BB258627}" dt="2023-10-22T15:40:10.141" v="158" actId="478"/>
-          <ac:spMkLst>
-            <pc:docMk/>
-            <pc:sldMk cId="3438836200" sldId="279"/>
-            <ac:spMk id="5" creationId="{4E9C2A46-B9E5-0E4F-976F-D911DC94B05C}"/>
-          </ac:spMkLst>
-        </pc:spChg>
-        <pc:spChg chg="add del mod">
-          <ac:chgData name="Marcia Moraes" userId="c9c67e8a-58e2-4733-9a1c-5d44fec4775b" providerId="ADAL" clId="{4FD32692-1E97-46E6-A4ED-31D1BB258627}" dt="2023-10-22T15:48:41.339" v="590"/>
-          <ac:spMkLst>
-            <pc:docMk/>
-            <pc:sldMk cId="3438836200" sldId="279"/>
-            <ac:spMk id="6" creationId="{8207123E-4932-480C-9833-9D268D44AFA6}"/>
-          </ac:spMkLst>
-        </pc:spChg>
-        <pc:spChg chg="add del mod">
-          <ac:chgData name="Marcia Moraes" userId="c9c67e8a-58e2-4733-9a1c-5d44fec4775b" providerId="ADAL" clId="{4FD32692-1E97-46E6-A4ED-31D1BB258627}" dt="2023-10-22T15:48:44.937" v="592" actId="478"/>
-          <ac:spMkLst>
-            <pc:docMk/>
-            <pc:sldMk cId="3438836200" sldId="279"/>
-            <ac:spMk id="7" creationId="{100C55F7-C2D2-415F-87EA-72086AAB222B}"/>
-          </ac:spMkLst>
-        </pc:spChg>
-        <pc:spChg chg="add mod">
-          <ac:chgData name="Marcia Moraes" userId="c9c67e8a-58e2-4733-9a1c-5d44fec4775b" providerId="ADAL" clId="{4FD32692-1E97-46E6-A4ED-31D1BB258627}" dt="2023-10-22T15:49:43.483" v="601" actId="207"/>
-          <ac:spMkLst>
-            <pc:docMk/>
-            <pc:sldMk cId="3438836200" sldId="279"/>
-            <ac:spMk id="8" creationId="{2FA7ECD9-954E-49D4-9274-BDDB3C75E793}"/>
-          </ac:spMkLst>
-        </pc:spChg>
+            <ac:graphicFrameMk id="8" creationId="{F1C5DBBB-ADFF-451A-9309-19A7746990A4}"/>
+          </ac:graphicFrameMkLst>
+        </pc:graphicFrameChg>
       </pc:sldChg>
     </pc:docChg>
   </pc:docChgLst>
   <pc:docChgLst>
+    <pc:chgData name="Marcia Moraes" userId="c9c67e8a-58e2-4733-9a1c-5d44fec4775b" providerId="ADAL" clId="{4FD32692-1E97-46E6-A4ED-31D1BB258627}"/>
+  </pc:docChgLst>
+  <pc:docChgLst>
     <pc:chgData name="Marcia Moraes" userId="c9c67e8a-58e2-4733-9a1c-5d44fec4775b" providerId="ADAL" clId="{35F1FE2E-5BBD-4055-98D8-C9F495EA4A27}"/>
-    <pc:docChg chg="delSld">
-      <pc:chgData name="Marcia Moraes" userId="c9c67e8a-58e2-4733-9a1c-5d44fec4775b" providerId="ADAL" clId="{35F1FE2E-5BBD-4055-98D8-C9F495EA4A27}" dt="2023-10-19T20:51:45.033" v="7" actId="2696"/>
-      <pc:docMkLst>
-        <pc:docMk/>
-      </pc:docMkLst>
-    </pc:docChg>
   </pc:docChgLst>
 </pc:chgInfo>
 </file>
@@ -496,7 +258,7 @@
           <a:p>
             <a:fld id="{4D7E51A5-B478-1E40-8CBB-0DAA8831E99D}" type="datetimeFigureOut">
               <a:rPr lang="en-US" smtClean="0"/>
-              <a:t>10/27/2023</a:t>
+              <a:t>3/7/2024</a:t>
             </a:fld>
             <a:endParaRPr lang="en-US"/>
           </a:p>
@@ -661,7 +423,7 @@
           <a:p>
             <a:fld id="{D0ED587F-861E-6740-9643-E3DDAE89B8D6}" type="datetimeFigureOut">
               <a:rPr lang="en-US" smtClean="0"/>
-              <a:t>10/27/2023</a:t>
+              <a:t>3/7/2024</a:t>
             </a:fld>
             <a:endParaRPr lang="en-US"/>
           </a:p>
@@ -8549,7 +8311,7 @@
           <p:nvPr>
             <p:extLst>
               <p:ext uri="{D42A27DB-BD31-4B8C-83A1-F6EECF244321}">
-                <p14:modId xmlns:p14="http://schemas.microsoft.com/office/powerpoint/2010/main" val="2428817260"/>
+                <p14:modId xmlns:p14="http://schemas.microsoft.com/office/powerpoint/2010/main" val="783797644"/>
               </p:ext>
             </p:extLst>
           </p:nvPr>
@@ -8857,10 +8619,28 @@
                         </a:spcAft>
                       </a:pPr>
                       <a:r>
+                        <a:rPr lang="en-US" sz="1600">
+                          <a:effectLst/>
+                        </a:rPr>
+                        <a:t>2 </a:t>
+                      </a:r>
+                      <a:r>
                         <a:rPr lang="en-US" sz="1600" dirty="0">
                           <a:effectLst/>
                         </a:rPr>
-                        <a:t>12 PM - 2 PM : CSB 120</a:t>
+                        <a:t>PM </a:t>
+                      </a:r>
+                      <a:r>
+                        <a:rPr lang="en-US" sz="1600">
+                          <a:effectLst/>
+                        </a:rPr>
+                        <a:t>- 5 </a:t>
+                      </a:r>
+                      <a:r>
+                        <a:rPr lang="en-US" sz="1600" dirty="0">
+                          <a:effectLst/>
+                        </a:rPr>
+                        <a:t>PM : CSB 120</a:t>
                       </a:r>
                       <a:endParaRPr lang="en-US" sz="1600" dirty="0">
                         <a:effectLst/>
@@ -20583,20 +20363,20 @@
 </file>
 
 <file path=customXml/item2.xml><?xml version="1.0" encoding="utf-8"?>
-<p:properties xmlns:p="http://schemas.microsoft.com/office/2006/metadata/properties" xmlns:xsi="http://www.w3.org/2001/XMLSchema-instance" xmlns:pc="http://schemas.microsoft.com/office/infopath/2007/PartnerControls">
-  <documentManagement>
-    <_activity xmlns="92c41bee-f0ee-4aa6-9399-a35fbb883510" xsi:nil="true"/>
-  </documentManagement>
-</p:properties>
-</file>
-
-<file path=customXml/item3.xml><?xml version="1.0" encoding="utf-8"?>
 <?mso-contentType ?>
 <FormTemplates xmlns="http://schemas.microsoft.com/sharepoint/v3/contenttype/forms">
   <Display>DocumentLibraryForm</Display>
   <Edit>DocumentLibraryForm</Edit>
   <New>DocumentLibraryForm</New>
 </FormTemplates>
+</file>
+
+<file path=customXml/item3.xml><?xml version="1.0" encoding="utf-8"?>
+<p:properties xmlns:p="http://schemas.microsoft.com/office/2006/metadata/properties" xmlns:xsi="http://www.w3.org/2001/XMLSchema-instance" xmlns:pc="http://schemas.microsoft.com/office/infopath/2007/PartnerControls">
+  <documentManagement>
+    <_activity xmlns="92c41bee-f0ee-4aa6-9399-a35fbb883510" xsi:nil="true"/>
+  </documentManagement>
+</p:properties>
 </file>
 
 <file path=customXml/itemProps1.xml><?xml version="1.0" encoding="utf-8"?>
@@ -20619,26 +20399,26 @@
 </file>
 
 <file path=customXml/itemProps2.xml><?xml version="1.0" encoding="utf-8"?>
-<ds:datastoreItem xmlns:ds="http://schemas.openxmlformats.org/officeDocument/2006/customXml" ds:itemID="{B0ABAC91-C1EB-481F-B60B-A09C54856BBA}">
+<ds:datastoreItem xmlns:ds="http://schemas.openxmlformats.org/officeDocument/2006/customXml" ds:itemID="{89A51EB2-5938-4503-962D-41917281861E}">
   <ds:schemaRefs>
-    <ds:schemaRef ds:uri="http://schemas.openxmlformats.org/package/2006/metadata/core-properties"/>
-    <ds:schemaRef ds:uri="http://schemas.microsoft.com/office/2006/metadata/properties"/>
-    <ds:schemaRef ds:uri="http://www.w3.org/XML/1998/namespace"/>
-    <ds:schemaRef ds:uri="http://schemas.microsoft.com/office/infopath/2007/PartnerControls"/>
-    <ds:schemaRef ds:uri="http://schemas.microsoft.com/office/2006/documentManagement/types"/>
-    <ds:schemaRef ds:uri="http://purl.org/dc/terms/"/>
-    <ds:schemaRef ds:uri="http://purl.org/dc/elements/1.1/"/>
-    <ds:schemaRef ds:uri="e06ed288-fd75-4b50-bbed-f5a5df88c31c"/>
-    <ds:schemaRef ds:uri="92c41bee-f0ee-4aa6-9399-a35fbb883510"/>
-    <ds:schemaRef ds:uri="http://purl.org/dc/dcmitype/"/>
+    <ds:schemaRef ds:uri="http://schemas.microsoft.com/sharepoint/v3/contenttype/forms"/>
   </ds:schemaRefs>
 </ds:datastoreItem>
 </file>
 
 <file path=customXml/itemProps3.xml><?xml version="1.0" encoding="utf-8"?>
-<ds:datastoreItem xmlns:ds="http://schemas.openxmlformats.org/officeDocument/2006/customXml" ds:itemID="{89A51EB2-5938-4503-962D-41917281861E}">
+<ds:datastoreItem xmlns:ds="http://schemas.openxmlformats.org/officeDocument/2006/customXml" ds:itemID="{B0ABAC91-C1EB-481F-B60B-A09C54856BBA}">
   <ds:schemaRefs>
-    <ds:schemaRef ds:uri="http://schemas.microsoft.com/sharepoint/v3/contenttype/forms"/>
+    <ds:schemaRef ds:uri="http://schemas.microsoft.com/office/infopath/2007/PartnerControls"/>
+    <ds:schemaRef ds:uri="http://purl.org/dc/dcmitype/"/>
+    <ds:schemaRef ds:uri="http://schemas.microsoft.com/office/2006/metadata/properties"/>
+    <ds:schemaRef ds:uri="http://schemas.openxmlformats.org/package/2006/metadata/core-properties"/>
+    <ds:schemaRef ds:uri="http://www.w3.org/XML/1998/namespace"/>
+    <ds:schemaRef ds:uri="92c41bee-f0ee-4aa6-9399-a35fbb883510"/>
+    <ds:schemaRef ds:uri="http://schemas.microsoft.com/office/2006/documentManagement/types"/>
+    <ds:schemaRef ds:uri="e06ed288-fd75-4b50-bbed-f5a5df88c31c"/>
+    <ds:schemaRef ds:uri="http://purl.org/dc/terms/"/>
+    <ds:schemaRef ds:uri="http://purl.org/dc/elements/1.1/"/>
   </ds:schemaRefs>
 </ds:datastoreItem>
 </file>
</xml_diff>